<commit_message>
Update Ui class diagram, figure 4
</commit_message>
<xml_diff>
--- a/docs/diagrams/UiComponentClassDiagram.pptx
+++ b/docs/diagrams/UiComponentClassDiagram.pptx
@@ -208,7 +208,7 @@
           <a:p>
             <a:fld id="{F5CC4B3F-88C1-4FFA-B1B6-F41C21DC6924}" type="datetimeFigureOut">
               <a:rPr lang="en-US" smtClean="0"/>
-              <a:t>12/15/2018</a:t>
+              <a:t>4/11/2019</a:t>
             </a:fld>
             <a:endParaRPr lang="en-US"/>
           </a:p>
@@ -475,6 +475,90 @@
 </p:notesMaster>
 </file>
 
+<file path=ppt/notesSlides/notesSlide1.xml><?xml version="1.0" encoding="utf-8"?>
+<p:notes xmlns:a="http://schemas.openxmlformats.org/drawingml/2006/main" xmlns:r="http://schemas.openxmlformats.org/officeDocument/2006/relationships" xmlns:p="http://schemas.openxmlformats.org/presentationml/2006/main">
+  <p:cSld>
+    <p:spTree>
+      <p:nvGrpSpPr>
+        <p:cNvPr id="1" name=""/>
+        <p:cNvGrpSpPr/>
+        <p:nvPr/>
+      </p:nvGrpSpPr>
+      <p:grpSpPr>
+        <a:xfrm>
+          <a:off x="0" y="0"/>
+          <a:ext cx="0" cy="0"/>
+          <a:chOff x="0" y="0"/>
+          <a:chExt cx="0" cy="0"/>
+        </a:xfrm>
+      </p:grpSpPr>
+      <p:sp>
+        <p:nvSpPr>
+          <p:cNvPr id="2" name="Slide Image Placeholder 1"/>
+          <p:cNvSpPr>
+            <a:spLocks noGrp="1" noRot="1" noChangeAspect="1"/>
+          </p:cNvSpPr>
+          <p:nvPr>
+            <p:ph type="sldImg"/>
+          </p:nvPr>
+        </p:nvSpPr>
+        <p:spPr/>
+      </p:sp>
+      <p:sp>
+        <p:nvSpPr>
+          <p:cNvPr id="3" name="Notes Placeholder 2"/>
+          <p:cNvSpPr>
+            <a:spLocks noGrp="1"/>
+          </p:cNvSpPr>
+          <p:nvPr>
+            <p:ph type="body" idx="1"/>
+          </p:nvPr>
+        </p:nvSpPr>
+        <p:spPr/>
+        <p:txBody>
+          <a:bodyPr/>
+          <a:lstStyle/>
+          <a:p>
+            <a:endParaRPr lang="en-SG" dirty="0"/>
+          </a:p>
+        </p:txBody>
+      </p:sp>
+      <p:sp>
+        <p:nvSpPr>
+          <p:cNvPr id="4" name="Slide Number Placeholder 3"/>
+          <p:cNvSpPr>
+            <a:spLocks noGrp="1"/>
+          </p:cNvSpPr>
+          <p:nvPr>
+            <p:ph type="sldNum" sz="quarter" idx="5"/>
+          </p:nvPr>
+        </p:nvSpPr>
+        <p:spPr/>
+        <p:txBody>
+          <a:bodyPr/>
+          <a:lstStyle/>
+          <a:p>
+            <a:fld id="{5A7AB025-77E3-4BD1-A2FD-B3183DBA47A3}" type="slidenum">
+              <a:rPr lang="en-US" smtClean="0"/>
+              <a:t>1</a:t>
+            </a:fld>
+            <a:endParaRPr lang="en-US"/>
+          </a:p>
+        </p:txBody>
+      </p:sp>
+    </p:spTree>
+    <p:extLst>
+      <p:ext uri="{BB962C8B-B14F-4D97-AF65-F5344CB8AC3E}">
+        <p14:creationId xmlns:p14="http://schemas.microsoft.com/office/powerpoint/2010/main" val="476123884"/>
+      </p:ext>
+    </p:extLst>
+  </p:cSld>
+  <p:clrMapOvr>
+    <a:masterClrMapping/>
+  </p:clrMapOvr>
+</p:notes>
+</file>
+
 <file path=ppt/slideLayouts/slideLayout1.xml><?xml version="1.0" encoding="utf-8"?>
 <p:sldLayout xmlns:a="http://schemas.openxmlformats.org/drawingml/2006/main" xmlns:r="http://schemas.openxmlformats.org/officeDocument/2006/relationships" xmlns:p="http://schemas.openxmlformats.org/presentationml/2006/main" type="title" preserve="1">
   <p:cSld name="Title Slide">
@@ -654,7 +738,7 @@
           <a:p>
             <a:fld id="{78C97017-6FC3-485B-9764-EAC9E56C1D49}" type="datetimeFigureOut">
               <a:rPr lang="en-US" smtClean="0"/>
-              <a:t>12/15/2018</a:t>
+              <a:t>4/11/2019</a:t>
             </a:fld>
             <a:endParaRPr lang="en-US"/>
           </a:p>
@@ -822,7 +906,7 @@
           <a:p>
             <a:fld id="{78C97017-6FC3-485B-9764-EAC9E56C1D49}" type="datetimeFigureOut">
               <a:rPr lang="en-US" smtClean="0"/>
-              <a:t>12/15/2018</a:t>
+              <a:t>4/11/2019</a:t>
             </a:fld>
             <a:endParaRPr lang="en-US"/>
           </a:p>
@@ -1000,7 +1084,7 @@
           <a:p>
             <a:fld id="{78C97017-6FC3-485B-9764-EAC9E56C1D49}" type="datetimeFigureOut">
               <a:rPr lang="en-US" smtClean="0"/>
-              <a:t>12/15/2018</a:t>
+              <a:t>4/11/2019</a:t>
             </a:fld>
             <a:endParaRPr lang="en-US"/>
           </a:p>
@@ -1168,7 +1252,7 @@
           <a:p>
             <a:fld id="{78C97017-6FC3-485B-9764-EAC9E56C1D49}" type="datetimeFigureOut">
               <a:rPr lang="en-US" smtClean="0"/>
-              <a:t>12/15/2018</a:t>
+              <a:t>4/11/2019</a:t>
             </a:fld>
             <a:endParaRPr lang="en-US"/>
           </a:p>
@@ -1413,7 +1497,7 @@
           <a:p>
             <a:fld id="{78C97017-6FC3-485B-9764-EAC9E56C1D49}" type="datetimeFigureOut">
               <a:rPr lang="en-US" smtClean="0"/>
-              <a:t>12/15/2018</a:t>
+              <a:t>4/11/2019</a:t>
             </a:fld>
             <a:endParaRPr lang="en-US"/>
           </a:p>
@@ -1698,7 +1782,7 @@
           <a:p>
             <a:fld id="{78C97017-6FC3-485B-9764-EAC9E56C1D49}" type="datetimeFigureOut">
               <a:rPr lang="en-US" smtClean="0"/>
-              <a:t>12/15/2018</a:t>
+              <a:t>4/11/2019</a:t>
             </a:fld>
             <a:endParaRPr lang="en-US"/>
           </a:p>
@@ -2117,7 +2201,7 @@
           <a:p>
             <a:fld id="{78C97017-6FC3-485B-9764-EAC9E56C1D49}" type="datetimeFigureOut">
               <a:rPr lang="en-US" smtClean="0"/>
-              <a:t>12/15/2018</a:t>
+              <a:t>4/11/2019</a:t>
             </a:fld>
             <a:endParaRPr lang="en-US"/>
           </a:p>
@@ -2234,7 +2318,7 @@
           <a:p>
             <a:fld id="{78C97017-6FC3-485B-9764-EAC9E56C1D49}" type="datetimeFigureOut">
               <a:rPr lang="en-US" smtClean="0"/>
-              <a:t>12/15/2018</a:t>
+              <a:t>4/11/2019</a:t>
             </a:fld>
             <a:endParaRPr lang="en-US"/>
           </a:p>
@@ -2329,7 +2413,7 @@
           <a:p>
             <a:fld id="{78C97017-6FC3-485B-9764-EAC9E56C1D49}" type="datetimeFigureOut">
               <a:rPr lang="en-US" smtClean="0"/>
-              <a:t>12/15/2018</a:t>
+              <a:t>4/11/2019</a:t>
             </a:fld>
             <a:endParaRPr lang="en-US"/>
           </a:p>
@@ -2604,7 +2688,7 @@
           <a:p>
             <a:fld id="{78C97017-6FC3-485B-9764-EAC9E56C1D49}" type="datetimeFigureOut">
               <a:rPr lang="en-US" smtClean="0"/>
-              <a:t>12/15/2018</a:t>
+              <a:t>4/11/2019</a:t>
             </a:fld>
             <a:endParaRPr lang="en-US"/>
           </a:p>
@@ -2856,7 +2940,7 @@
           <a:p>
             <a:fld id="{78C97017-6FC3-485B-9764-EAC9E56C1D49}" type="datetimeFigureOut">
               <a:rPr lang="en-US" smtClean="0"/>
-              <a:t>12/15/2018</a:t>
+              <a:t>4/11/2019</a:t>
             </a:fld>
             <a:endParaRPr lang="en-US"/>
           </a:p>
@@ -3067,7 +3151,7 @@
           <a:p>
             <a:fld id="{78C97017-6FC3-485B-9764-EAC9E56C1D49}" type="datetimeFigureOut">
               <a:rPr lang="en-US" smtClean="0"/>
-              <a:t>12/15/2018</a:t>
+              <a:t>4/11/2019</a:t>
             </a:fld>
             <a:endParaRPr lang="en-US"/>
           </a:p>
@@ -3450,8 +3534,8 @@
         </p:nvSpPr>
         <p:spPr>
           <a:xfrm>
-            <a:off x="1217465" y="1447800"/>
-            <a:ext cx="4917083" cy="3962400"/>
+            <a:off x="1217465" y="609600"/>
+            <a:ext cx="4917083" cy="5943599"/>
           </a:xfrm>
           <a:prstGeom prst="roundRect">
             <a:avLst>
@@ -3512,7 +3596,7 @@
         </p:nvSpPr>
         <p:spPr>
           <a:xfrm>
-            <a:off x="2095948" y="2341220"/>
+            <a:off x="1905000" y="1503021"/>
             <a:ext cx="1093635" cy="346760"/>
           </a:xfrm>
           <a:prstGeom prst="rect">
@@ -3572,7 +3656,7 @@
         </p:nvSpPr>
         <p:spPr>
           <a:xfrm>
-            <a:off x="2592528" y="2971800"/>
+            <a:off x="2592528" y="2133601"/>
             <a:ext cx="1093635" cy="236841"/>
           </a:xfrm>
           <a:prstGeom prst="rect">
@@ -3632,7 +3716,7 @@
         </p:nvSpPr>
         <p:spPr>
           <a:xfrm>
-            <a:off x="2092842" y="1770924"/>
+            <a:off x="2092842" y="932725"/>
             <a:ext cx="1093635" cy="346760"/>
           </a:xfrm>
           <a:prstGeom prst="rect">
@@ -3693,9 +3777,9 @@
           <p:nvPr/>
         </p:nvCxnSpPr>
         <p:spPr>
-          <a:xfrm rot="16200000" flipH="1">
-            <a:off x="2529445" y="2227899"/>
-            <a:ext cx="223536" cy="3106"/>
+          <a:xfrm rot="5400000">
+            <a:off x="2433971" y="1297332"/>
+            <a:ext cx="223536" cy="187842"/>
           </a:xfrm>
           <a:prstGeom prst="bentConnector3">
             <a:avLst>
@@ -3734,7 +3818,7 @@
         </p:nvSpPr>
         <p:spPr>
           <a:xfrm rot="10800000" flipV="1">
-            <a:off x="5394717" y="2110477"/>
+            <a:off x="5394717" y="1272278"/>
             <a:ext cx="270504" cy="175523"/>
           </a:xfrm>
           <a:prstGeom prst="triangle">
@@ -3782,7 +3866,7 @@
         </p:nvCxnSpPr>
         <p:spPr>
           <a:xfrm flipV="1">
-            <a:off x="644735" y="2991937"/>
+            <a:off x="644735" y="2153738"/>
             <a:ext cx="684904" cy="1"/>
           </a:xfrm>
           <a:prstGeom prst="bentConnector3">
@@ -3825,7 +3909,7 @@
         </p:nvSpPr>
         <p:spPr>
           <a:xfrm rot="16200000">
-            <a:off x="5703829" y="2464877"/>
+            <a:off x="5703829" y="1626678"/>
             <a:ext cx="2362201" cy="328045"/>
           </a:xfrm>
           <a:prstGeom prst="roundRect">
@@ -3885,7 +3969,7 @@
         </p:nvSpPr>
         <p:spPr>
           <a:xfrm>
-            <a:off x="2592528" y="3649359"/>
+            <a:off x="2592528" y="2811160"/>
             <a:ext cx="1093635" cy="236841"/>
           </a:xfrm>
           <a:prstGeom prst="rect">
@@ -3925,7 +4009,7 @@
                   </a:schemeClr>
                 </a:solidFill>
               </a:rPr>
-              <a:t>BrowserPanel</a:t>
+              <a:t>SavingsPanel</a:t>
             </a:r>
             <a:endParaRPr lang="en-SG" sz="1050" b="1" dirty="0">
               <a:solidFill>
@@ -3945,7 +4029,7 @@
         </p:nvSpPr>
         <p:spPr>
           <a:xfrm>
-            <a:off x="2592527" y="4563759"/>
+            <a:off x="2592527" y="4572001"/>
             <a:ext cx="1093635" cy="236841"/>
           </a:xfrm>
           <a:prstGeom prst="rect">
@@ -4005,8 +4089,8 @@
         </p:nvSpPr>
         <p:spPr>
           <a:xfrm>
-            <a:off x="2592526" y="3991960"/>
-            <a:ext cx="1093635" cy="236841"/>
+            <a:off x="2592525" y="3166421"/>
+            <a:ext cx="1194067" cy="222147"/>
           </a:xfrm>
           <a:prstGeom prst="rect">
             <a:avLst/>
@@ -4045,7 +4129,7 @@
                   </a:schemeClr>
                 </a:solidFill>
               </a:rPr>
-              <a:t>PersonListPanel</a:t>
+              <a:t>ExpenseListPanel</a:t>
             </a:r>
             <a:endParaRPr lang="en-SG" sz="1050" b="1" dirty="0">
               <a:solidFill>
@@ -4065,7 +4149,7 @@
         </p:nvSpPr>
         <p:spPr>
           <a:xfrm>
-            <a:off x="3839323" y="4228801"/>
+            <a:off x="3839323" y="3390602"/>
             <a:ext cx="1040906" cy="236841"/>
           </a:xfrm>
           <a:prstGeom prst="rect">
@@ -4105,7 +4189,7 @@
                   </a:schemeClr>
                 </a:solidFill>
               </a:rPr>
-              <a:t>PersonCard</a:t>
+              <a:t>ExpenseCard</a:t>
             </a:r>
             <a:endParaRPr lang="en-SG" sz="1050" b="1" dirty="0">
               <a:solidFill>
@@ -4125,7 +4209,7 @@
         </p:nvSpPr>
         <p:spPr>
           <a:xfrm>
-            <a:off x="2592528" y="4966000"/>
+            <a:off x="2592528" y="5020960"/>
             <a:ext cx="1093635" cy="236841"/>
           </a:xfrm>
           <a:prstGeom prst="rect">
@@ -4185,7 +4269,7 @@
         </p:nvSpPr>
         <p:spPr>
           <a:xfrm>
-            <a:off x="2324548" y="2706452"/>
+            <a:off x="2324548" y="1868253"/>
             <a:ext cx="183156" cy="161573"/>
           </a:xfrm>
           <a:prstGeom prst="flowChartDecision">
@@ -4236,7 +4320,7 @@
         </p:nvCxnSpPr>
         <p:spPr>
           <a:xfrm rot="16200000" flipH="1">
-            <a:off x="2393229" y="2890922"/>
+            <a:off x="2393229" y="2052723"/>
             <a:ext cx="222196" cy="176402"/>
           </a:xfrm>
           <a:prstGeom prst="bentConnector2">
@@ -4274,7 +4358,7 @@
         </p:nvSpPr>
         <p:spPr>
           <a:xfrm>
-            <a:off x="2590799" y="3304308"/>
+            <a:off x="2590799" y="2466109"/>
             <a:ext cx="1095361" cy="236841"/>
           </a:xfrm>
           <a:prstGeom prst="rect">
@@ -4337,7 +4421,7 @@
         </p:nvCxnSpPr>
         <p:spPr>
           <a:xfrm rot="16200000" flipH="1">
-            <a:off x="2054450" y="3229701"/>
+            <a:off x="2054450" y="2391502"/>
             <a:ext cx="899755" cy="176402"/>
           </a:xfrm>
           <a:prstGeom prst="bentConnector2">
@@ -4371,6 +4455,7 @@
         <p:nvCxnSpPr>
           <p:cNvPr id="47" name="Elbow Connector 63"/>
           <p:cNvCxnSpPr>
+            <a:cxnSpLocks/>
             <a:stCxn id="39" idx="2"/>
             <a:endCxn id="36" idx="1"/>
           </p:cNvCxnSpPr>
@@ -4378,8 +4463,8 @@
         </p:nvCxnSpPr>
         <p:spPr>
           <a:xfrm rot="16200000" flipH="1">
-            <a:off x="1883148" y="3401003"/>
-            <a:ext cx="1242356" cy="176400"/>
+            <a:off x="1880491" y="2565460"/>
+            <a:ext cx="1247669" cy="176399"/>
           </a:xfrm>
           <a:prstGeom prst="bentConnector2">
             <a:avLst/>
@@ -4412,15 +4497,14 @@
         <p:nvCxnSpPr>
           <p:cNvPr id="50" name="Elbow Connector 63"/>
           <p:cNvCxnSpPr>
-            <a:stCxn id="39" idx="2"/>
-            <a:endCxn id="35" idx="1"/>
+            <a:cxnSpLocks/>
           </p:cNvCxnSpPr>
           <p:nvPr/>
         </p:nvCxnSpPr>
         <p:spPr>
           <a:xfrm rot="16200000" flipH="1">
-            <a:off x="1597249" y="3686901"/>
-            <a:ext cx="1814155" cy="176401"/>
+            <a:off x="1168948" y="3271923"/>
+            <a:ext cx="2660596" cy="176401"/>
           </a:xfrm>
           <a:prstGeom prst="bentConnector2">
             <a:avLst/>
@@ -4453,14 +4537,14 @@
         <p:nvCxnSpPr>
           <p:cNvPr id="53" name="Elbow Connector 63"/>
           <p:cNvCxnSpPr>
-            <a:endCxn id="38" idx="1"/>
+            <a:cxnSpLocks/>
           </p:cNvCxnSpPr>
           <p:nvPr/>
         </p:nvCxnSpPr>
         <p:spPr>
           <a:xfrm rot="16200000" flipH="1">
-            <a:off x="1184119" y="3676012"/>
-            <a:ext cx="2396440" cy="420377"/>
+            <a:off x="746486" y="3298419"/>
+            <a:ext cx="3303528" cy="388556"/>
           </a:xfrm>
           <a:prstGeom prst="bentConnector2">
             <a:avLst/>
@@ -4497,7 +4581,7 @@
         </p:nvSpPr>
         <p:spPr>
           <a:xfrm>
-            <a:off x="5143948" y="1770924"/>
+            <a:off x="5143948" y="932725"/>
             <a:ext cx="772043" cy="346760"/>
           </a:xfrm>
           <a:prstGeom prst="rect">
@@ -4572,14 +4656,13 @@
         <p:nvCxnSpPr>
           <p:cNvPr id="74" name="Elbow Connector 63"/>
           <p:cNvCxnSpPr>
-            <a:stCxn id="43" idx="3"/>
-            <a:endCxn id="16" idx="3"/>
+            <a:cxnSpLocks/>
           </p:cNvCxnSpPr>
           <p:nvPr/>
         </p:nvCxnSpPr>
         <p:spPr>
           <a:xfrm flipV="1">
-            <a:off x="3686160" y="2286000"/>
+            <a:off x="3681080" y="1447801"/>
             <a:ext cx="1843809" cy="1136729"/>
           </a:xfrm>
           <a:prstGeom prst="bentConnector2">
@@ -4613,14 +4696,13 @@
         <p:nvCxnSpPr>
           <p:cNvPr id="77" name="Elbow Connector 63"/>
           <p:cNvCxnSpPr>
-            <a:stCxn id="16" idx="3"/>
-            <a:endCxn id="37" idx="3"/>
+            <a:cxnSpLocks/>
           </p:cNvCxnSpPr>
           <p:nvPr/>
         </p:nvCxnSpPr>
         <p:spPr>
           <a:xfrm rot="5400000">
-            <a:off x="4174488" y="2991741"/>
+            <a:off x="4169408" y="2153542"/>
             <a:ext cx="2061222" cy="649740"/>
           </a:xfrm>
           <a:prstGeom prst="bentConnector2">
@@ -4654,14 +4736,13 @@
         <p:nvCxnSpPr>
           <p:cNvPr id="82" name="Elbow Connector 63"/>
           <p:cNvCxnSpPr>
-            <a:stCxn id="16" idx="3"/>
-            <a:endCxn id="34" idx="3"/>
+            <a:cxnSpLocks/>
           </p:cNvCxnSpPr>
           <p:nvPr/>
         </p:nvCxnSpPr>
         <p:spPr>
           <a:xfrm rot="5400000">
-            <a:off x="3867176" y="2104987"/>
+            <a:off x="3862096" y="1266788"/>
             <a:ext cx="1481780" cy="1843806"/>
           </a:xfrm>
           <a:prstGeom prst="bentConnector2">
@@ -4702,8 +4783,8 @@
         </p:nvCxnSpPr>
         <p:spPr>
           <a:xfrm flipV="1">
-            <a:off x="3189583" y="2286000"/>
-            <a:ext cx="2340386" cy="228600"/>
+            <a:off x="2998635" y="1447801"/>
+            <a:ext cx="2531334" cy="228600"/>
           </a:xfrm>
           <a:prstGeom prst="bentConnector2">
             <a:avLst/>
@@ -4736,15 +4817,14 @@
         <p:nvCxnSpPr>
           <p:cNvPr id="91" name="Elbow Connector 63"/>
           <p:cNvCxnSpPr>
-            <a:stCxn id="16" idx="3"/>
-            <a:endCxn id="35" idx="3"/>
+            <a:cxnSpLocks/>
           </p:cNvCxnSpPr>
           <p:nvPr/>
         </p:nvCxnSpPr>
         <p:spPr>
           <a:xfrm rot="5400000">
-            <a:off x="3409976" y="2562187"/>
-            <a:ext cx="2396180" cy="1843807"/>
+            <a:off x="2981676" y="2147208"/>
+            <a:ext cx="3242621" cy="1843807"/>
           </a:xfrm>
           <a:prstGeom prst="bentConnector2">
             <a:avLst/>
@@ -4777,15 +4857,14 @@
         <p:nvCxnSpPr>
           <p:cNvPr id="94" name="Elbow Connector 63"/>
           <p:cNvCxnSpPr>
-            <a:stCxn id="16" idx="3"/>
-            <a:endCxn id="38" idx="3"/>
+            <a:cxnSpLocks/>
           </p:cNvCxnSpPr>
           <p:nvPr/>
         </p:nvCxnSpPr>
         <p:spPr>
           <a:xfrm rot="5400000">
-            <a:off x="3208856" y="2763307"/>
-            <a:ext cx="2798421" cy="1843806"/>
+            <a:off x="2757196" y="2371688"/>
+            <a:ext cx="3691580" cy="1843806"/>
           </a:xfrm>
           <a:prstGeom prst="bentConnector2">
             <a:avLst/>
@@ -4824,7 +4903,7 @@
         </p:nvCxnSpPr>
         <p:spPr>
           <a:xfrm rot="5400000" flipH="1" flipV="1">
-            <a:off x="4594921" y="-355061"/>
+            <a:off x="4594921" y="-1193260"/>
             <a:ext cx="170724" cy="4081246"/>
           </a:xfrm>
           <a:prstGeom prst="bentConnector2">
@@ -4863,8 +4942,8 @@
         </p:nvSpPr>
         <p:spPr>
           <a:xfrm rot="16200000">
-            <a:off x="6213739" y="4560376"/>
-            <a:ext cx="1371599" cy="328045"/>
+            <a:off x="5375539" y="4560376"/>
+            <a:ext cx="3048000" cy="328045"/>
           </a:xfrm>
           <a:prstGeom prst="roundRect">
             <a:avLst/>
@@ -4923,7 +5002,7 @@
         </p:nvSpPr>
         <p:spPr>
           <a:xfrm rot="16200000">
-            <a:off x="956202" y="2861202"/>
+            <a:off x="956202" y="2023003"/>
             <a:ext cx="1093635" cy="346760"/>
           </a:xfrm>
           <a:prstGeom prst="rect">
@@ -4993,7 +5072,7 @@
         </p:nvSpPr>
         <p:spPr>
           <a:xfrm flipV="1">
-            <a:off x="1367767" y="2286001"/>
+            <a:off x="1367767" y="1447802"/>
             <a:ext cx="270504" cy="175523"/>
           </a:xfrm>
           <a:prstGeom prst="triangle">
@@ -5044,7 +5123,7 @@
         </p:nvCxnSpPr>
         <p:spPr>
           <a:xfrm rot="10800000" flipV="1">
-            <a:off x="1503020" y="1944303"/>
+            <a:off x="1503020" y="1106104"/>
             <a:ext cx="589823" cy="341697"/>
           </a:xfrm>
           <a:prstGeom prst="bentConnector2">
@@ -5086,7 +5165,7 @@
         </p:nvCxnSpPr>
         <p:spPr>
           <a:xfrm rot="16200000" flipH="1">
-            <a:off x="2226110" y="3058040"/>
+            <a:off x="2226110" y="2219841"/>
             <a:ext cx="554704" cy="174673"/>
           </a:xfrm>
           <a:prstGeom prst="bentConnector2">
@@ -5120,14 +5199,13 @@
         <p:nvCxnSpPr>
           <p:cNvPr id="132" name="Elbow Connector 63"/>
           <p:cNvCxnSpPr>
-            <a:stCxn id="16" idx="3"/>
-            <a:endCxn id="3" idx="3"/>
+            <a:cxnSpLocks/>
           </p:cNvCxnSpPr>
           <p:nvPr/>
         </p:nvCxnSpPr>
         <p:spPr>
           <a:xfrm rot="5400000">
-            <a:off x="4205956" y="1766207"/>
+            <a:off x="4200876" y="928008"/>
             <a:ext cx="804221" cy="1843806"/>
           </a:xfrm>
           <a:prstGeom prst="bentConnector2">
@@ -5161,6 +5239,7 @@
         <p:nvCxnSpPr>
           <p:cNvPr id="137" name="Elbow Connector 136"/>
           <p:cNvCxnSpPr>
+            <a:cxnSpLocks/>
             <a:stCxn id="36" idx="2"/>
             <a:endCxn id="37" idx="1"/>
           </p:cNvCxnSpPr>
@@ -5168,8 +5247,8 @@
         </p:nvCxnSpPr>
         <p:spPr>
           <a:xfrm rot="16200000" flipH="1">
-            <a:off x="3430123" y="3938021"/>
-            <a:ext cx="118421" cy="699979"/>
+            <a:off x="3454214" y="3123913"/>
+            <a:ext cx="120455" cy="649764"/>
           </a:xfrm>
           <a:prstGeom prst="bentConnector2">
             <a:avLst/>
@@ -5202,6 +5281,7 @@
         <p:nvCxnSpPr>
           <p:cNvPr id="140" name="Elbow Connector 63"/>
           <p:cNvCxnSpPr>
+            <a:cxnSpLocks/>
             <a:stCxn id="16" idx="3"/>
             <a:endCxn id="36" idx="3"/>
           </p:cNvCxnSpPr>
@@ -5209,8 +5289,8 @@
         </p:nvCxnSpPr>
         <p:spPr>
           <a:xfrm rot="5400000">
-            <a:off x="3695875" y="2276286"/>
-            <a:ext cx="1824381" cy="1843808"/>
+            <a:off x="3743434" y="1490960"/>
+            <a:ext cx="1829694" cy="1743377"/>
           </a:xfrm>
           <a:prstGeom prst="bentConnector2">
             <a:avLst/>
@@ -5247,7 +5327,7 @@
         </p:nvSpPr>
         <p:spPr>
           <a:xfrm>
-            <a:off x="5422048" y="2339335"/>
+            <a:off x="5422048" y="1501136"/>
             <a:ext cx="229325" cy="166560"/>
           </a:xfrm>
           <a:prstGeom prst="rect">
@@ -5300,8 +5380,8 @@
         </p:nvSpPr>
         <p:spPr>
           <a:xfrm>
-            <a:off x="3186477" y="2405681"/>
-            <a:ext cx="3537529" cy="45719"/>
+            <a:off x="2971800" y="1567482"/>
+            <a:ext cx="3735478" cy="81211"/>
           </a:xfrm>
           <a:custGeom>
             <a:avLst/>
@@ -5382,7 +5462,7 @@
         </p:nvSpPr>
         <p:spPr>
           <a:xfrm>
-            <a:off x="5431573" y="4488138"/>
+            <a:off x="5431573" y="3649939"/>
             <a:ext cx="229325" cy="160062"/>
           </a:xfrm>
           <a:prstGeom prst="rect">
@@ -5435,7 +5515,7 @@
         </p:nvSpPr>
         <p:spPr>
           <a:xfrm flipV="1">
-            <a:off x="4114799" y="4472708"/>
+            <a:off x="4114799" y="3634509"/>
             <a:ext cx="2642195" cy="101600"/>
           </a:xfrm>
           <a:custGeom>
@@ -5509,6 +5589,590 @@
           </a:p>
         </p:txBody>
       </p:sp>
+      <p:sp>
+        <p:nvSpPr>
+          <p:cNvPr id="54" name="Rectangle 11">
+            <a:extLst>
+              <a:ext uri="{FF2B5EF4-FFF2-40B4-BE49-F238E27FC236}">
+                <a16:creationId xmlns:a16="http://schemas.microsoft.com/office/drawing/2014/main" id="{7E4D0E65-966F-4700-89D7-44EE0DE00F61}"/>
+              </a:ext>
+            </a:extLst>
+          </p:cNvPr>
+          <p:cNvSpPr/>
+          <p:nvPr/>
+        </p:nvSpPr>
+        <p:spPr>
+          <a:xfrm>
+            <a:off x="2596461" y="3681852"/>
+            <a:ext cx="1194067" cy="222147"/>
+          </a:xfrm>
+          <a:prstGeom prst="rect">
+            <a:avLst/>
+          </a:prstGeom>
+          <a:ln w="19050">
+            <a:solidFill>
+              <a:schemeClr val="accent3"/>
+            </a:solidFill>
+          </a:ln>
+          <a:effectLst/>
+        </p:spPr>
+        <p:style>
+          <a:lnRef idx="1">
+            <a:schemeClr val="accent3"/>
+          </a:lnRef>
+          <a:fillRef idx="2">
+            <a:schemeClr val="accent3"/>
+          </a:fillRef>
+          <a:effectRef idx="1">
+            <a:schemeClr val="accent3"/>
+          </a:effectRef>
+          <a:fontRef idx="minor">
+            <a:schemeClr val="dk1"/>
+          </a:fontRef>
+        </p:style>
+        <p:txBody>
+          <a:bodyPr rtlCol="0" anchor="ctr"/>
+          <a:lstStyle/>
+          <a:p>
+            <a:pPr algn="ctr"/>
+            <a:r>
+              <a:rPr lang="en-US" sz="1050" b="1" dirty="0" err="1">
+                <a:solidFill>
+                  <a:schemeClr val="accent3">
+                    <a:lumMod val="75000"/>
+                  </a:schemeClr>
+                </a:solidFill>
+              </a:rPr>
+              <a:t>BudgetListPanel</a:t>
+            </a:r>
+            <a:endParaRPr lang="en-SG" sz="1050" b="1" dirty="0">
+              <a:solidFill>
+                <a:schemeClr val="accent3">
+                  <a:lumMod val="75000"/>
+                </a:schemeClr>
+              </a:solidFill>
+            </a:endParaRPr>
+          </a:p>
+        </p:txBody>
+      </p:sp>
+      <p:cxnSp>
+        <p:nvCxnSpPr>
+          <p:cNvPr id="55" name="Elbow Connector 63">
+            <a:extLst>
+              <a:ext uri="{FF2B5EF4-FFF2-40B4-BE49-F238E27FC236}">
+                <a16:creationId xmlns:a16="http://schemas.microsoft.com/office/drawing/2014/main" id="{D136ABA9-E4F7-4884-A3F9-C3EBCB1FF335}"/>
+              </a:ext>
+            </a:extLst>
+          </p:cNvPr>
+          <p:cNvCxnSpPr>
+            <a:cxnSpLocks/>
+          </p:cNvCxnSpPr>
+          <p:nvPr/>
+        </p:nvCxnSpPr>
+        <p:spPr>
+          <a:xfrm rot="16200000" flipH="1">
+            <a:off x="1878766" y="3079305"/>
+            <a:ext cx="1247669" cy="176399"/>
+          </a:xfrm>
+          <a:prstGeom prst="bentConnector2">
+            <a:avLst/>
+          </a:prstGeom>
+          <a:ln w="19050">
+            <a:solidFill>
+              <a:schemeClr val="accent3"/>
+            </a:solidFill>
+            <a:headEnd type="none" w="med" len="med"/>
+            <a:tailEnd type="arrow" w="med" len="med"/>
+          </a:ln>
+          <a:effectLst/>
+        </p:spPr>
+        <p:style>
+          <a:lnRef idx="1">
+            <a:schemeClr val="accent2"/>
+          </a:lnRef>
+          <a:fillRef idx="2">
+            <a:schemeClr val="accent2"/>
+          </a:fillRef>
+          <a:effectRef idx="1">
+            <a:schemeClr val="accent2"/>
+          </a:effectRef>
+          <a:fontRef idx="minor">
+            <a:schemeClr val="dk1"/>
+          </a:fontRef>
+        </p:style>
+      </p:cxnSp>
+      <p:sp>
+        <p:nvSpPr>
+          <p:cNvPr id="56" name="Rectangle 11">
+            <a:extLst>
+              <a:ext uri="{FF2B5EF4-FFF2-40B4-BE49-F238E27FC236}">
+                <a16:creationId xmlns:a16="http://schemas.microsoft.com/office/drawing/2014/main" id="{52A14C57-A886-4A6E-A6D7-0D0CB5D9CBEC}"/>
+              </a:ext>
+            </a:extLst>
+          </p:cNvPr>
+          <p:cNvSpPr/>
+          <p:nvPr/>
+        </p:nvSpPr>
+        <p:spPr>
+          <a:xfrm>
+            <a:off x="3840833" y="3924002"/>
+            <a:ext cx="1040906" cy="236841"/>
+          </a:xfrm>
+          <a:prstGeom prst="rect">
+            <a:avLst/>
+          </a:prstGeom>
+          <a:ln w="19050">
+            <a:solidFill>
+              <a:schemeClr val="accent3"/>
+            </a:solidFill>
+          </a:ln>
+          <a:effectLst/>
+        </p:spPr>
+        <p:style>
+          <a:lnRef idx="1">
+            <a:schemeClr val="accent3"/>
+          </a:lnRef>
+          <a:fillRef idx="2">
+            <a:schemeClr val="accent3"/>
+          </a:fillRef>
+          <a:effectRef idx="1">
+            <a:schemeClr val="accent3"/>
+          </a:effectRef>
+          <a:fontRef idx="minor">
+            <a:schemeClr val="dk1"/>
+          </a:fontRef>
+        </p:style>
+        <p:txBody>
+          <a:bodyPr rtlCol="0" anchor="ctr"/>
+          <a:lstStyle/>
+          <a:p>
+            <a:pPr algn="ctr"/>
+            <a:r>
+              <a:rPr lang="en-US" sz="1050" b="1" dirty="0" err="1">
+                <a:solidFill>
+                  <a:schemeClr val="accent3">
+                    <a:lumMod val="75000"/>
+                  </a:schemeClr>
+                </a:solidFill>
+              </a:rPr>
+              <a:t>BudgetCard</a:t>
+            </a:r>
+            <a:endParaRPr lang="en-SG" sz="1050" b="1" dirty="0">
+              <a:solidFill>
+                <a:schemeClr val="accent3">
+                  <a:lumMod val="75000"/>
+                </a:schemeClr>
+              </a:solidFill>
+            </a:endParaRPr>
+          </a:p>
+        </p:txBody>
+      </p:sp>
+      <p:cxnSp>
+        <p:nvCxnSpPr>
+          <p:cNvPr id="57" name="Elbow Connector 63">
+            <a:extLst>
+              <a:ext uri="{FF2B5EF4-FFF2-40B4-BE49-F238E27FC236}">
+                <a16:creationId xmlns:a16="http://schemas.microsoft.com/office/drawing/2014/main" id="{09F4DCFF-1FFE-409E-8589-28695B71231D}"/>
+              </a:ext>
+            </a:extLst>
+          </p:cNvPr>
+          <p:cNvCxnSpPr>
+            <a:cxnSpLocks/>
+          </p:cNvCxnSpPr>
+          <p:nvPr/>
+        </p:nvCxnSpPr>
+        <p:spPr>
+          <a:xfrm rot="5400000">
+            <a:off x="4170918" y="2686942"/>
+            <a:ext cx="2061222" cy="649740"/>
+          </a:xfrm>
+          <a:prstGeom prst="bentConnector2">
+            <a:avLst/>
+          </a:prstGeom>
+          <a:ln w="6350">
+            <a:solidFill>
+              <a:schemeClr val="accent3"/>
+            </a:solidFill>
+            <a:headEnd type="none" w="med" len="med"/>
+            <a:tailEnd type="none" w="med" len="med"/>
+          </a:ln>
+          <a:effectLst/>
+        </p:spPr>
+        <p:style>
+          <a:lnRef idx="1">
+            <a:schemeClr val="accent2"/>
+          </a:lnRef>
+          <a:fillRef idx="2">
+            <a:schemeClr val="accent2"/>
+          </a:fillRef>
+          <a:effectRef idx="1">
+            <a:schemeClr val="accent2"/>
+          </a:effectRef>
+          <a:fontRef idx="minor">
+            <a:schemeClr val="dk1"/>
+          </a:fontRef>
+        </p:style>
+      </p:cxnSp>
+      <p:cxnSp>
+        <p:nvCxnSpPr>
+          <p:cNvPr id="58" name="Elbow Connector 136">
+            <a:extLst>
+              <a:ext uri="{FF2B5EF4-FFF2-40B4-BE49-F238E27FC236}">
+                <a16:creationId xmlns:a16="http://schemas.microsoft.com/office/drawing/2014/main" id="{68693561-6799-4541-A9DF-A9439CC875EE}"/>
+              </a:ext>
+            </a:extLst>
+          </p:cNvPr>
+          <p:cNvCxnSpPr>
+            <a:cxnSpLocks/>
+            <a:endCxn id="56" idx="1"/>
+          </p:cNvCxnSpPr>
+          <p:nvPr/>
+        </p:nvCxnSpPr>
+        <p:spPr>
+          <a:xfrm rot="16200000" flipH="1">
+            <a:off x="3455724" y="3657313"/>
+            <a:ext cx="120455" cy="649764"/>
+          </a:xfrm>
+          <a:prstGeom prst="bentConnector2">
+            <a:avLst/>
+          </a:prstGeom>
+          <a:ln w="19050">
+            <a:solidFill>
+              <a:schemeClr val="accent3"/>
+            </a:solidFill>
+            <a:headEnd type="none" w="med" len="med"/>
+            <a:tailEnd type="arrow" w="med" len="med"/>
+          </a:ln>
+          <a:effectLst/>
+        </p:spPr>
+        <p:style>
+          <a:lnRef idx="1">
+            <a:schemeClr val="accent2"/>
+          </a:lnRef>
+          <a:fillRef idx="2">
+            <a:schemeClr val="accent2"/>
+          </a:fillRef>
+          <a:effectRef idx="1">
+            <a:schemeClr val="accent2"/>
+          </a:effectRef>
+          <a:fontRef idx="minor">
+            <a:schemeClr val="dk1"/>
+          </a:fontRef>
+        </p:style>
+      </p:cxnSp>
+      <p:sp>
+        <p:nvSpPr>
+          <p:cNvPr id="59" name="Freeform 117">
+            <a:extLst>
+              <a:ext uri="{FF2B5EF4-FFF2-40B4-BE49-F238E27FC236}">
+                <a16:creationId xmlns:a16="http://schemas.microsoft.com/office/drawing/2014/main" id="{EAABC75C-74AC-4C1B-B1D0-B2E1DCE4B34B}"/>
+              </a:ext>
+            </a:extLst>
+          </p:cNvPr>
+          <p:cNvSpPr/>
+          <p:nvPr/>
+        </p:nvSpPr>
+        <p:spPr>
+          <a:xfrm flipV="1">
+            <a:off x="4116309" y="4167909"/>
+            <a:ext cx="2642195" cy="101600"/>
+          </a:xfrm>
+          <a:custGeom>
+            <a:avLst/>
+            <a:gdLst>
+              <a:gd name="connsiteX0" fmla="*/ 0 w 3048000"/>
+              <a:gd name="connsiteY0" fmla="*/ 203200 h 203200"/>
+              <a:gd name="connsiteX1" fmla="*/ 221673 w 3048000"/>
+              <a:gd name="connsiteY1" fmla="*/ 0 h 203200"/>
+              <a:gd name="connsiteX2" fmla="*/ 3048000 w 3048000"/>
+              <a:gd name="connsiteY2" fmla="*/ 0 h 203200"/>
+            </a:gdLst>
+            <a:ahLst/>
+            <a:cxnLst>
+              <a:cxn ang="0">
+                <a:pos x="connsiteX0" y="connsiteY0"/>
+              </a:cxn>
+              <a:cxn ang="0">
+                <a:pos x="connsiteX1" y="connsiteY1"/>
+              </a:cxn>
+              <a:cxn ang="0">
+                <a:pos x="connsiteX2" y="connsiteY2"/>
+              </a:cxn>
+            </a:cxnLst>
+            <a:rect l="l" t="t" r="r" b="b"/>
+            <a:pathLst>
+              <a:path w="3048000" h="203200">
+                <a:moveTo>
+                  <a:pt x="0" y="203200"/>
+                </a:moveTo>
+                <a:lnTo>
+                  <a:pt x="221673" y="0"/>
+                </a:lnTo>
+                <a:lnTo>
+                  <a:pt x="3048000" y="0"/>
+                </a:lnTo>
+              </a:path>
+            </a:pathLst>
+          </a:custGeom>
+          <a:noFill/>
+          <a:ln w="19050">
+            <a:solidFill>
+              <a:schemeClr val="accent3"/>
+            </a:solidFill>
+            <a:prstDash val="sysDot"/>
+            <a:headEnd type="none" w="med" len="med"/>
+            <a:tailEnd type="arrow" w="med" len="med"/>
+          </a:ln>
+          <a:effectLst/>
+        </p:spPr>
+        <p:style>
+          <a:lnRef idx="1">
+            <a:schemeClr val="accent2"/>
+          </a:lnRef>
+          <a:fillRef idx="2">
+            <a:schemeClr val="accent2"/>
+          </a:fillRef>
+          <a:effectRef idx="1">
+            <a:schemeClr val="accent2"/>
+          </a:effectRef>
+          <a:fontRef idx="minor">
+            <a:schemeClr val="dk1"/>
+          </a:fontRef>
+        </p:style>
+        <p:txBody>
+          <a:bodyPr rtlCol="0" anchor="ctr"/>
+          <a:lstStyle/>
+          <a:p>
+            <a:pPr algn="ctr"/>
+            <a:endParaRPr lang="en-SG"/>
+          </a:p>
+        </p:txBody>
+      </p:sp>
+      <p:sp>
+        <p:nvSpPr>
+          <p:cNvPr id="60" name="Rectangle 11">
+            <a:extLst>
+              <a:ext uri="{FF2B5EF4-FFF2-40B4-BE49-F238E27FC236}">
+                <a16:creationId xmlns:a16="http://schemas.microsoft.com/office/drawing/2014/main" id="{0B4C1AEB-7A7B-4FF4-A995-E46926D79E61}"/>
+              </a:ext>
+            </a:extLst>
+          </p:cNvPr>
+          <p:cNvSpPr/>
+          <p:nvPr/>
+        </p:nvSpPr>
+        <p:spPr>
+          <a:xfrm>
+            <a:off x="2589026" y="5478160"/>
+            <a:ext cx="1093635" cy="236841"/>
+          </a:xfrm>
+          <a:prstGeom prst="rect">
+            <a:avLst/>
+          </a:prstGeom>
+          <a:ln w="19050">
+            <a:solidFill>
+              <a:schemeClr val="accent3"/>
+            </a:solidFill>
+          </a:ln>
+          <a:effectLst/>
+        </p:spPr>
+        <p:style>
+          <a:lnRef idx="1">
+            <a:schemeClr val="accent3"/>
+          </a:lnRef>
+          <a:fillRef idx="2">
+            <a:schemeClr val="accent3"/>
+          </a:fillRef>
+          <a:effectRef idx="1">
+            <a:schemeClr val="accent3"/>
+          </a:effectRef>
+          <a:fontRef idx="minor">
+            <a:schemeClr val="dk1"/>
+          </a:fontRef>
+        </p:style>
+        <p:txBody>
+          <a:bodyPr rtlCol="0" anchor="ctr"/>
+          <a:lstStyle/>
+          <a:p>
+            <a:pPr algn="ctr"/>
+            <a:r>
+              <a:rPr lang="en-US" sz="1050" b="1" dirty="0" err="1">
+                <a:solidFill>
+                  <a:schemeClr val="accent3">
+                    <a:lumMod val="75000"/>
+                  </a:schemeClr>
+                </a:solidFill>
+              </a:rPr>
+              <a:t>ReportWindow</a:t>
+            </a:r>
+            <a:endParaRPr lang="en-SG" sz="1050" b="1" dirty="0">
+              <a:solidFill>
+                <a:schemeClr val="accent3">
+                  <a:lumMod val="75000"/>
+                </a:schemeClr>
+              </a:solidFill>
+            </a:endParaRPr>
+          </a:p>
+        </p:txBody>
+      </p:sp>
+      <p:cxnSp>
+        <p:nvCxnSpPr>
+          <p:cNvPr id="61" name="Elbow Connector 63">
+            <a:extLst>
+              <a:ext uri="{FF2B5EF4-FFF2-40B4-BE49-F238E27FC236}">
+                <a16:creationId xmlns:a16="http://schemas.microsoft.com/office/drawing/2014/main" id="{859226EF-034C-43BC-A5CD-EAE6534D8DFB}"/>
+              </a:ext>
+            </a:extLst>
+          </p:cNvPr>
+          <p:cNvCxnSpPr>
+            <a:cxnSpLocks/>
+          </p:cNvCxnSpPr>
+          <p:nvPr/>
+        </p:nvCxnSpPr>
+        <p:spPr>
+          <a:xfrm rot="16200000" flipH="1">
+            <a:off x="401834" y="3414468"/>
+            <a:ext cx="3760729" cy="613655"/>
+          </a:xfrm>
+          <a:prstGeom prst="bentConnector2">
+            <a:avLst/>
+          </a:prstGeom>
+          <a:ln w="19050">
+            <a:solidFill>
+              <a:schemeClr val="accent3"/>
+            </a:solidFill>
+            <a:headEnd type="none" w="med" len="med"/>
+            <a:tailEnd type="arrow" w="med" len="med"/>
+          </a:ln>
+          <a:effectLst/>
+        </p:spPr>
+        <p:style>
+          <a:lnRef idx="1">
+            <a:schemeClr val="accent2"/>
+          </a:lnRef>
+          <a:fillRef idx="2">
+            <a:schemeClr val="accent2"/>
+          </a:fillRef>
+          <a:effectRef idx="1">
+            <a:schemeClr val="accent2"/>
+          </a:effectRef>
+          <a:fontRef idx="minor">
+            <a:schemeClr val="dk1"/>
+          </a:fontRef>
+        </p:style>
+      </p:cxnSp>
+      <p:sp>
+        <p:nvSpPr>
+          <p:cNvPr id="68" name="Rectangle 11">
+            <a:extLst>
+              <a:ext uri="{FF2B5EF4-FFF2-40B4-BE49-F238E27FC236}">
+                <a16:creationId xmlns:a16="http://schemas.microsoft.com/office/drawing/2014/main" id="{83FBFB99-62E5-4212-8455-D08C9EF6344D}"/>
+              </a:ext>
+            </a:extLst>
+          </p:cNvPr>
+          <p:cNvSpPr/>
+          <p:nvPr/>
+        </p:nvSpPr>
+        <p:spPr>
+          <a:xfrm>
+            <a:off x="3839323" y="5715000"/>
+            <a:ext cx="1040906" cy="236841"/>
+          </a:xfrm>
+          <a:prstGeom prst="rect">
+            <a:avLst/>
+          </a:prstGeom>
+          <a:ln w="19050">
+            <a:solidFill>
+              <a:schemeClr val="accent3"/>
+            </a:solidFill>
+          </a:ln>
+          <a:effectLst/>
+        </p:spPr>
+        <p:style>
+          <a:lnRef idx="1">
+            <a:schemeClr val="accent3"/>
+          </a:lnRef>
+          <a:fillRef idx="2">
+            <a:schemeClr val="accent3"/>
+          </a:fillRef>
+          <a:effectRef idx="1">
+            <a:schemeClr val="accent3"/>
+          </a:effectRef>
+          <a:fontRef idx="minor">
+            <a:schemeClr val="dk1"/>
+          </a:fontRef>
+        </p:style>
+        <p:txBody>
+          <a:bodyPr rtlCol="0" anchor="ctr"/>
+          <a:lstStyle/>
+          <a:p>
+            <a:pPr algn="ctr"/>
+            <a:r>
+              <a:rPr lang="en-US" sz="1050" b="1" dirty="0" err="1">
+                <a:solidFill>
+                  <a:schemeClr val="accent3">
+                    <a:lumMod val="75000"/>
+                  </a:schemeClr>
+                </a:solidFill>
+              </a:rPr>
+              <a:t>ReportData</a:t>
+            </a:r>
+            <a:endParaRPr lang="en-SG" sz="1050" b="1" dirty="0">
+              <a:solidFill>
+                <a:schemeClr val="accent3">
+                  <a:lumMod val="75000"/>
+                </a:schemeClr>
+              </a:solidFill>
+            </a:endParaRPr>
+          </a:p>
+        </p:txBody>
+      </p:sp>
+      <p:cxnSp>
+        <p:nvCxnSpPr>
+          <p:cNvPr id="69" name="Elbow Connector 136">
+            <a:extLst>
+              <a:ext uri="{FF2B5EF4-FFF2-40B4-BE49-F238E27FC236}">
+                <a16:creationId xmlns:a16="http://schemas.microsoft.com/office/drawing/2014/main" id="{B4B39658-803A-477E-A39A-738C1692E595}"/>
+              </a:ext>
+            </a:extLst>
+          </p:cNvPr>
+          <p:cNvCxnSpPr>
+            <a:cxnSpLocks/>
+            <a:endCxn id="68" idx="1"/>
+          </p:cNvCxnSpPr>
+          <p:nvPr/>
+        </p:nvCxnSpPr>
+        <p:spPr>
+          <a:xfrm rot="16200000" flipH="1">
+            <a:off x="3454214" y="5448311"/>
+            <a:ext cx="120455" cy="649764"/>
+          </a:xfrm>
+          <a:prstGeom prst="bentConnector2">
+            <a:avLst/>
+          </a:prstGeom>
+          <a:ln w="19050">
+            <a:solidFill>
+              <a:schemeClr val="accent3"/>
+            </a:solidFill>
+            <a:headEnd type="none" w="med" len="med"/>
+            <a:tailEnd type="arrow" w="med" len="med"/>
+          </a:ln>
+          <a:effectLst/>
+        </p:spPr>
+        <p:style>
+          <a:lnRef idx="1">
+            <a:schemeClr val="accent2"/>
+          </a:lnRef>
+          <a:fillRef idx="2">
+            <a:schemeClr val="accent2"/>
+          </a:fillRef>
+          <a:effectRef idx="1">
+            <a:schemeClr val="accent2"/>
+          </a:effectRef>
+          <a:fontRef idx="minor">
+            <a:schemeClr val="dk1"/>
+          </a:fontRef>
+        </p:style>
+      </p:cxnSp>
     </p:spTree>
     <p:extLst>
       <p:ext uri="{BB962C8B-B14F-4D97-AF65-F5344CB8AC3E}">

</xml_diff>

<commit_message>
Update addBudgetSequenceDiagram and ui class diagram
</commit_message>
<xml_diff>
--- a/docs/diagrams/UiComponentClassDiagram.pptx
+++ b/docs/diagrams/UiComponentClassDiagram.pptx
@@ -5948,72 +5948,6 @@
           </a:p>
         </p:txBody>
       </p:sp>
-      <p:sp>
-        <p:nvSpPr>
-          <p:cNvPr id="60" name="Rectangle 11">
-            <a:extLst>
-              <a:ext uri="{FF2B5EF4-FFF2-40B4-BE49-F238E27FC236}">
-                <a16:creationId xmlns:a16="http://schemas.microsoft.com/office/drawing/2014/main" id="{0B4C1AEB-7A7B-4FF4-A995-E46926D79E61}"/>
-              </a:ext>
-            </a:extLst>
-          </p:cNvPr>
-          <p:cNvSpPr/>
-          <p:nvPr/>
-        </p:nvSpPr>
-        <p:spPr>
-          <a:xfrm>
-            <a:off x="2589026" y="5478160"/>
-            <a:ext cx="1093635" cy="236841"/>
-          </a:xfrm>
-          <a:prstGeom prst="rect">
-            <a:avLst/>
-          </a:prstGeom>
-          <a:ln w="19050">
-            <a:solidFill>
-              <a:schemeClr val="accent3"/>
-            </a:solidFill>
-          </a:ln>
-          <a:effectLst/>
-        </p:spPr>
-        <p:style>
-          <a:lnRef idx="1">
-            <a:schemeClr val="accent3"/>
-          </a:lnRef>
-          <a:fillRef idx="2">
-            <a:schemeClr val="accent3"/>
-          </a:fillRef>
-          <a:effectRef idx="1">
-            <a:schemeClr val="accent3"/>
-          </a:effectRef>
-          <a:fontRef idx="minor">
-            <a:schemeClr val="dk1"/>
-          </a:fontRef>
-        </p:style>
-        <p:txBody>
-          <a:bodyPr rtlCol="0" anchor="ctr"/>
-          <a:lstStyle/>
-          <a:p>
-            <a:pPr algn="ctr"/>
-            <a:r>
-              <a:rPr lang="en-US" sz="1050" b="1" dirty="0" err="1">
-                <a:solidFill>
-                  <a:schemeClr val="accent3">
-                    <a:lumMod val="75000"/>
-                  </a:schemeClr>
-                </a:solidFill>
-              </a:rPr>
-              <a:t>ReportWindow</a:t>
-            </a:r>
-            <a:endParaRPr lang="en-SG" sz="1050" b="1" dirty="0">
-              <a:solidFill>
-                <a:schemeClr val="accent3">
-                  <a:lumMod val="75000"/>
-                </a:schemeClr>
-              </a:solidFill>
-            </a:endParaRPr>
-          </a:p>
-        </p:txBody>
-      </p:sp>
       <p:cxnSp>
         <p:nvCxnSpPr>
           <p:cNvPr id="61" name="Elbow Connector 63">
@@ -6173,6 +6107,248 @@
           </a:fontRef>
         </p:style>
       </p:cxnSp>
+      <p:sp>
+        <p:nvSpPr>
+          <p:cNvPr id="62" name="Freeform 117">
+            <a:extLst>
+              <a:ext uri="{FF2B5EF4-FFF2-40B4-BE49-F238E27FC236}">
+                <a16:creationId xmlns:a16="http://schemas.microsoft.com/office/drawing/2014/main" id="{5ADA3A8C-1EEA-451D-AE19-51F19589074D}"/>
+              </a:ext>
+            </a:extLst>
+          </p:cNvPr>
+          <p:cNvSpPr/>
+          <p:nvPr/>
+        </p:nvSpPr>
+        <p:spPr>
+          <a:xfrm flipV="1">
+            <a:off x="4093862" y="5974080"/>
+            <a:ext cx="2642195" cy="101600"/>
+          </a:xfrm>
+          <a:custGeom>
+            <a:avLst/>
+            <a:gdLst>
+              <a:gd name="connsiteX0" fmla="*/ 0 w 3048000"/>
+              <a:gd name="connsiteY0" fmla="*/ 203200 h 203200"/>
+              <a:gd name="connsiteX1" fmla="*/ 221673 w 3048000"/>
+              <a:gd name="connsiteY1" fmla="*/ 0 h 203200"/>
+              <a:gd name="connsiteX2" fmla="*/ 3048000 w 3048000"/>
+              <a:gd name="connsiteY2" fmla="*/ 0 h 203200"/>
+            </a:gdLst>
+            <a:ahLst/>
+            <a:cxnLst>
+              <a:cxn ang="0">
+                <a:pos x="connsiteX0" y="connsiteY0"/>
+              </a:cxn>
+              <a:cxn ang="0">
+                <a:pos x="connsiteX1" y="connsiteY1"/>
+              </a:cxn>
+              <a:cxn ang="0">
+                <a:pos x="connsiteX2" y="connsiteY2"/>
+              </a:cxn>
+            </a:cxnLst>
+            <a:rect l="l" t="t" r="r" b="b"/>
+            <a:pathLst>
+              <a:path w="3048000" h="203200">
+                <a:moveTo>
+                  <a:pt x="0" y="203200"/>
+                </a:moveTo>
+                <a:lnTo>
+                  <a:pt x="221673" y="0"/>
+                </a:lnTo>
+                <a:lnTo>
+                  <a:pt x="3048000" y="0"/>
+                </a:lnTo>
+              </a:path>
+            </a:pathLst>
+          </a:custGeom>
+          <a:noFill/>
+          <a:ln w="19050">
+            <a:solidFill>
+              <a:schemeClr val="accent3"/>
+            </a:solidFill>
+            <a:prstDash val="sysDot"/>
+            <a:headEnd type="none" w="med" len="med"/>
+            <a:tailEnd type="arrow" w="med" len="med"/>
+          </a:ln>
+          <a:effectLst/>
+        </p:spPr>
+        <p:style>
+          <a:lnRef idx="1">
+            <a:schemeClr val="accent2"/>
+          </a:lnRef>
+          <a:fillRef idx="2">
+            <a:schemeClr val="accent2"/>
+          </a:fillRef>
+          <a:effectRef idx="1">
+            <a:schemeClr val="accent2"/>
+          </a:effectRef>
+          <a:fontRef idx="minor">
+            <a:schemeClr val="dk1"/>
+          </a:fontRef>
+        </p:style>
+        <p:txBody>
+          <a:bodyPr rtlCol="0" anchor="ctr"/>
+          <a:lstStyle/>
+          <a:p>
+            <a:pPr algn="ctr"/>
+            <a:endParaRPr lang="en-SG"/>
+          </a:p>
+        </p:txBody>
+      </p:sp>
+      <p:sp>
+        <p:nvSpPr>
+          <p:cNvPr id="63" name="Freeform 117">
+            <a:extLst>
+              <a:ext uri="{FF2B5EF4-FFF2-40B4-BE49-F238E27FC236}">
+                <a16:creationId xmlns:a16="http://schemas.microsoft.com/office/drawing/2014/main" id="{77CA2BC1-F282-4371-B9A5-7062BEAD4C12}"/>
+              </a:ext>
+            </a:extLst>
+          </p:cNvPr>
+          <p:cNvSpPr/>
+          <p:nvPr/>
+        </p:nvSpPr>
+        <p:spPr>
+          <a:xfrm flipV="1">
+            <a:off x="3492353" y="5539376"/>
+            <a:ext cx="3243163" cy="46175"/>
+          </a:xfrm>
+          <a:custGeom>
+            <a:avLst/>
+            <a:gdLst>
+              <a:gd name="connsiteX0" fmla="*/ 0 w 3048000"/>
+              <a:gd name="connsiteY0" fmla="*/ 203200 h 203200"/>
+              <a:gd name="connsiteX1" fmla="*/ 221673 w 3048000"/>
+              <a:gd name="connsiteY1" fmla="*/ 0 h 203200"/>
+              <a:gd name="connsiteX2" fmla="*/ 3048000 w 3048000"/>
+              <a:gd name="connsiteY2" fmla="*/ 0 h 203200"/>
+            </a:gdLst>
+            <a:ahLst/>
+            <a:cxnLst>
+              <a:cxn ang="0">
+                <a:pos x="connsiteX0" y="connsiteY0"/>
+              </a:cxn>
+              <a:cxn ang="0">
+                <a:pos x="connsiteX1" y="connsiteY1"/>
+              </a:cxn>
+              <a:cxn ang="0">
+                <a:pos x="connsiteX2" y="connsiteY2"/>
+              </a:cxn>
+            </a:cxnLst>
+            <a:rect l="l" t="t" r="r" b="b"/>
+            <a:pathLst>
+              <a:path w="3048000" h="203200">
+                <a:moveTo>
+                  <a:pt x="0" y="203200"/>
+                </a:moveTo>
+                <a:lnTo>
+                  <a:pt x="221673" y="0"/>
+                </a:lnTo>
+                <a:lnTo>
+                  <a:pt x="3048000" y="0"/>
+                </a:lnTo>
+              </a:path>
+            </a:pathLst>
+          </a:custGeom>
+          <a:noFill/>
+          <a:ln w="19050">
+            <a:solidFill>
+              <a:schemeClr val="accent3"/>
+            </a:solidFill>
+            <a:prstDash val="sysDot"/>
+            <a:headEnd type="none" w="med" len="med"/>
+            <a:tailEnd type="arrow" w="med" len="med"/>
+          </a:ln>
+          <a:effectLst/>
+        </p:spPr>
+        <p:style>
+          <a:lnRef idx="1">
+            <a:schemeClr val="accent2"/>
+          </a:lnRef>
+          <a:fillRef idx="2">
+            <a:schemeClr val="accent2"/>
+          </a:fillRef>
+          <a:effectRef idx="1">
+            <a:schemeClr val="accent2"/>
+          </a:effectRef>
+          <a:fontRef idx="minor">
+            <a:schemeClr val="dk1"/>
+          </a:fontRef>
+        </p:style>
+        <p:txBody>
+          <a:bodyPr rtlCol="0" anchor="ctr"/>
+          <a:lstStyle/>
+          <a:p>
+            <a:pPr algn="ctr"/>
+            <a:endParaRPr lang="en-SG"/>
+          </a:p>
+        </p:txBody>
+      </p:sp>
+      <p:sp>
+        <p:nvSpPr>
+          <p:cNvPr id="60" name="Rectangle 11">
+            <a:extLst>
+              <a:ext uri="{FF2B5EF4-FFF2-40B4-BE49-F238E27FC236}">
+                <a16:creationId xmlns:a16="http://schemas.microsoft.com/office/drawing/2014/main" id="{0B4C1AEB-7A7B-4FF4-A995-E46926D79E61}"/>
+              </a:ext>
+            </a:extLst>
+          </p:cNvPr>
+          <p:cNvSpPr/>
+          <p:nvPr/>
+        </p:nvSpPr>
+        <p:spPr>
+          <a:xfrm>
+            <a:off x="2589026" y="5478160"/>
+            <a:ext cx="1093635" cy="236841"/>
+          </a:xfrm>
+          <a:prstGeom prst="rect">
+            <a:avLst/>
+          </a:prstGeom>
+          <a:ln w="19050">
+            <a:solidFill>
+              <a:schemeClr val="accent3"/>
+            </a:solidFill>
+          </a:ln>
+          <a:effectLst/>
+        </p:spPr>
+        <p:style>
+          <a:lnRef idx="1">
+            <a:schemeClr val="accent3"/>
+          </a:lnRef>
+          <a:fillRef idx="2">
+            <a:schemeClr val="accent3"/>
+          </a:fillRef>
+          <a:effectRef idx="1">
+            <a:schemeClr val="accent3"/>
+          </a:effectRef>
+          <a:fontRef idx="minor">
+            <a:schemeClr val="dk1"/>
+          </a:fontRef>
+        </p:style>
+        <p:txBody>
+          <a:bodyPr rtlCol="0" anchor="ctr"/>
+          <a:lstStyle/>
+          <a:p>
+            <a:pPr algn="ctr"/>
+            <a:r>
+              <a:rPr lang="en-US" sz="1050" b="1" dirty="0" err="1">
+                <a:solidFill>
+                  <a:schemeClr val="accent3">
+                    <a:lumMod val="75000"/>
+                  </a:schemeClr>
+                </a:solidFill>
+              </a:rPr>
+              <a:t>ReportWindow</a:t>
+            </a:r>
+            <a:endParaRPr lang="en-SG" sz="1050" b="1" dirty="0">
+              <a:solidFill>
+                <a:schemeClr val="accent3">
+                  <a:lumMod val="75000"/>
+                </a:schemeClr>
+              </a:solidFill>
+            </a:endParaRPr>
+          </a:p>
+        </p:txBody>
+      </p:sp>
     </p:spTree>
     <p:extLst>
       <p:ext uri="{BB962C8B-B14F-4D97-AF65-F5344CB8AC3E}">

</xml_diff>